<commit_message>
add pdf of ppt
</commit_message>
<xml_diff>
--- a/新竹市社會處 PIPELINE(New).pptx
+++ b/新竹市社會處 PIPELINE(New).pptx
@@ -5,7 +5,7 @@
     <p:sldMasterId id="2147483648" r:id="rId1"/>
   </p:sldMasterIdLst>
   <p:notesMasterIdLst>
-    <p:notesMasterId r:id="rId17"/>
+    <p:notesMasterId r:id="rId18"/>
   </p:notesMasterIdLst>
   <p:sldIdLst>
     <p:sldId id="256" r:id="rId2"/>
@@ -21,8 +21,9 @@
     <p:sldId id="266" r:id="rId12"/>
     <p:sldId id="275" r:id="rId13"/>
     <p:sldId id="276" r:id="rId14"/>
-    <p:sldId id="274" r:id="rId15"/>
-    <p:sldId id="267" r:id="rId16"/>
+    <p:sldId id="285" r:id="rId15"/>
+    <p:sldId id="274" r:id="rId16"/>
+    <p:sldId id="267" r:id="rId17"/>
   </p:sldIdLst>
   <p:sldSz cx="9144000" cy="5143500" type="screen16x9"/>
   <p:notesSz cx="6858000" cy="9144000"/>
@@ -222,7 +223,7 @@
           <a:p>
             <a:fld id="{B4DB2679-F535-46E2-A3A3-5F6B17EFB8E3}" type="datetimeFigureOut">
               <a:rPr lang="zh-TW" altLang="en-US" smtClean="0"/>
-              <a:t>2017/11/26</a:t>
+              <a:t>2017/11/27</a:t>
             </a:fld>
             <a:endParaRPr lang="zh-TW" altLang="en-US"/>
           </a:p>
@@ -1174,7 +1175,7 @@
           <a:p>
             <a:fld id="{79C8EB11-B45F-4D29-9742-3A2D0BA8B9A3}" type="datetime1">
               <a:rPr lang="zh-TW" altLang="en-US" smtClean="0"/>
-              <a:t>2017/11/26</a:t>
+              <a:t>2017/11/27</a:t>
             </a:fld>
             <a:endParaRPr lang="zh-TW" altLang="en-US"/>
           </a:p>
@@ -1454,7 +1455,7 @@
           <a:p>
             <a:fld id="{E4398E98-F64A-48DD-8B2B-3A25B20EC597}" type="datetime1">
               <a:rPr lang="zh-TW" altLang="en-US" smtClean="0"/>
-              <a:t>2017/11/26</a:t>
+              <a:t>2017/11/27</a:t>
             </a:fld>
             <a:endParaRPr lang="zh-TW" altLang="en-US"/>
           </a:p>
@@ -1634,7 +1635,7 @@
           <a:p>
             <a:fld id="{F5990BA1-DA1D-42B0-AE80-C67E5EE9FFF8}" type="datetime1">
               <a:rPr lang="zh-TW" altLang="en-US" smtClean="0"/>
-              <a:t>2017/11/26</a:t>
+              <a:t>2017/11/27</a:t>
             </a:fld>
             <a:endParaRPr lang="zh-TW" altLang="en-US"/>
           </a:p>
@@ -1878,7 +1879,7 @@
           <a:p>
             <a:fld id="{4C4087DA-A603-4F3A-AD65-9A089A01D4C7}" type="datetime1">
               <a:rPr lang="zh-TW" altLang="en-US" smtClean="0"/>
-              <a:t>2017/11/26</a:t>
+              <a:t>2017/11/27</a:t>
             </a:fld>
             <a:endParaRPr lang="zh-TW" altLang="en-US"/>
           </a:p>
@@ -2229,7 +2230,7 @@
           <a:p>
             <a:fld id="{D0F4B25F-4AB0-4B29-9955-E6493AE080D0}" type="datetime1">
               <a:rPr lang="zh-TW" altLang="en-US" smtClean="0"/>
-              <a:t>2017/11/26</a:t>
+              <a:t>2017/11/27</a:t>
             </a:fld>
             <a:endParaRPr lang="zh-TW" altLang="en-US"/>
           </a:p>
@@ -2517,7 +2518,7 @@
           <a:p>
             <a:fld id="{F9571759-2BD7-4F8F-BEEC-A86E9A5CAB92}" type="datetime1">
               <a:rPr lang="zh-TW" altLang="en-US" smtClean="0"/>
-              <a:t>2017/11/26</a:t>
+              <a:t>2017/11/27</a:t>
             </a:fld>
             <a:endParaRPr lang="zh-TW" altLang="en-US"/>
           </a:p>
@@ -2944,7 +2945,7 @@
           <a:p>
             <a:fld id="{C4876340-B95F-4565-B32F-B2EF5CEB830B}" type="datetime1">
               <a:rPr lang="zh-TW" altLang="en-US" smtClean="0"/>
-              <a:t>2017/11/26</a:t>
+              <a:t>2017/11/27</a:t>
             </a:fld>
             <a:endParaRPr lang="zh-TW" altLang="en-US"/>
           </a:p>
@@ -3062,7 +3063,7 @@
           <a:p>
             <a:fld id="{E16CB1AE-098B-4343-B3DA-CFB4F351FCED}" type="datetime1">
               <a:rPr lang="zh-TW" altLang="en-US" smtClean="0"/>
-              <a:t>2017/11/26</a:t>
+              <a:t>2017/11/27</a:t>
             </a:fld>
             <a:endParaRPr lang="zh-TW" altLang="en-US"/>
           </a:p>
@@ -3157,7 +3158,7 @@
           <a:p>
             <a:fld id="{A78D8308-BA06-4B5F-A8B0-E051330C43A9}" type="datetime1">
               <a:rPr lang="zh-TW" altLang="en-US" smtClean="0"/>
-              <a:t>2017/11/26</a:t>
+              <a:t>2017/11/27</a:t>
             </a:fld>
             <a:endParaRPr lang="zh-TW" altLang="en-US"/>
           </a:p>
@@ -3434,7 +3435,7 @@
           <a:p>
             <a:fld id="{FDD44F22-C951-4463-9C58-D4DD60DBA6F5}" type="datetime1">
               <a:rPr lang="zh-TW" altLang="en-US" smtClean="0"/>
-              <a:t>2017/11/26</a:t>
+              <a:t>2017/11/27</a:t>
             </a:fld>
             <a:endParaRPr lang="zh-TW" altLang="en-US"/>
           </a:p>
@@ -3687,7 +3688,7 @@
           <a:p>
             <a:fld id="{C00E1189-4DED-42F0-9FEF-D99B8BD1450E}" type="datetime1">
               <a:rPr lang="zh-TW" altLang="en-US" smtClean="0"/>
-              <a:t>2017/11/26</a:t>
+              <a:t>2017/11/27</a:t>
             </a:fld>
             <a:endParaRPr lang="zh-TW" altLang="en-US"/>
           </a:p>
@@ -3900,7 +3901,7 @@
           <a:p>
             <a:fld id="{D15E9A3A-8120-4DB8-99B2-2A8711574E35}" type="datetime1">
               <a:rPr lang="zh-TW" altLang="en-US" smtClean="0"/>
-              <a:t>2017/11/26</a:t>
+              <a:t>2017/11/27</a:t>
             </a:fld>
             <a:endParaRPr lang="zh-TW" altLang="en-US"/>
           </a:p>
@@ -7607,6 +7608,149 @@
       </p:grpSpPr>
       <p:sp>
         <p:nvSpPr>
+          <p:cNvPr id="3" name="投影片編號版面配置區 2"/>
+          <p:cNvSpPr>
+            <a:spLocks noGrp="1"/>
+          </p:cNvSpPr>
+          <p:nvPr>
+            <p:ph type="sldNum" sz="quarter" idx="12"/>
+          </p:nvPr>
+        </p:nvSpPr>
+        <p:spPr/>
+        <p:txBody>
+          <a:bodyPr/>
+          <a:lstStyle/>
+          <a:p>
+            <a:fld id="{458270D0-B830-4E87-A9C7-B662AFD560B4}" type="slidenum">
+              <a:rPr lang="zh-TW" altLang="en-US" smtClean="0"/>
+              <a:t>14</a:t>
+            </a:fld>
+            <a:endParaRPr lang="zh-TW" altLang="en-US"/>
+          </a:p>
+        </p:txBody>
+      </p:sp>
+      <p:pic>
+        <p:nvPicPr>
+          <p:cNvPr id="4" name="圖片 3"/>
+          <p:cNvPicPr>
+            <a:picLocks noChangeAspect="1"/>
+          </p:cNvPicPr>
+          <p:nvPr/>
+        </p:nvPicPr>
+        <p:blipFill>
+          <a:blip r:embed="rId2" cstate="print">
+            <a:extLst>
+              <a:ext uri="{28A0092B-C50C-407E-A947-70E740481C1C}">
+                <a14:useLocalDpi xmlns:a14="http://schemas.microsoft.com/office/drawing/2010/main" val="0"/>
+              </a:ext>
+            </a:extLst>
+          </a:blip>
+          <a:stretch>
+            <a:fillRect/>
+          </a:stretch>
+        </p:blipFill>
+        <p:spPr>
+          <a:xfrm>
+            <a:off x="5595541" y="195486"/>
+            <a:ext cx="2648867" cy="4711452"/>
+          </a:xfrm>
+          <a:prstGeom prst="rect">
+            <a:avLst/>
+          </a:prstGeom>
+        </p:spPr>
+      </p:pic>
+      <p:pic>
+        <p:nvPicPr>
+          <p:cNvPr id="5" name="圖片 4"/>
+          <p:cNvPicPr>
+            <a:picLocks noChangeAspect="1"/>
+          </p:cNvPicPr>
+          <p:nvPr/>
+        </p:nvPicPr>
+        <p:blipFill>
+          <a:blip r:embed="rId3" cstate="print">
+            <a:extLst>
+              <a:ext uri="{28A0092B-C50C-407E-A947-70E740481C1C}">
+                <a14:useLocalDpi xmlns:a14="http://schemas.microsoft.com/office/drawing/2010/main" val="0"/>
+              </a:ext>
+            </a:extLst>
+          </a:blip>
+          <a:stretch>
+            <a:fillRect/>
+          </a:stretch>
+        </p:blipFill>
+        <p:spPr>
+          <a:xfrm>
+            <a:off x="2654666" y="195486"/>
+            <a:ext cx="2648867" cy="4711452"/>
+          </a:xfrm>
+          <a:prstGeom prst="rect">
+            <a:avLst/>
+          </a:prstGeom>
+        </p:spPr>
+      </p:pic>
+      <p:pic>
+        <p:nvPicPr>
+          <p:cNvPr id="6" name="圖片 5"/>
+          <p:cNvPicPr>
+            <a:picLocks noChangeAspect="1"/>
+          </p:cNvPicPr>
+          <p:nvPr/>
+        </p:nvPicPr>
+        <p:blipFill>
+          <a:blip r:embed="rId4">
+            <a:extLst>
+              <a:ext uri="{28A0092B-C50C-407E-A947-70E740481C1C}">
+                <a14:useLocalDpi xmlns:a14="http://schemas.microsoft.com/office/drawing/2010/main" val="0"/>
+              </a:ext>
+            </a:extLst>
+          </a:blip>
+          <a:stretch>
+            <a:fillRect/>
+          </a:stretch>
+        </p:blipFill>
+        <p:spPr>
+          <a:xfrm>
+            <a:off x="710450" y="2859782"/>
+            <a:ext cx="2137181" cy="2137181"/>
+          </a:xfrm>
+          <a:prstGeom prst="rect">
+            <a:avLst/>
+          </a:prstGeom>
+        </p:spPr>
+      </p:pic>
+    </p:spTree>
+    <p:extLst>
+      <p:ext uri="{BB962C8B-B14F-4D97-AF65-F5344CB8AC3E}">
+        <p14:creationId xmlns:p14="http://schemas.microsoft.com/office/powerpoint/2010/main" val="2974244934"/>
+      </p:ext>
+    </p:extLst>
+  </p:cSld>
+  <p:clrMapOvr>
+    <a:masterClrMapping/>
+  </p:clrMapOvr>
+</p:sld>
+</file>
+
+<file path=ppt/slides/slide15.xml><?xml version="1.0" encoding="utf-8"?>
+<p:sld xmlns:a="http://schemas.openxmlformats.org/drawingml/2006/main" xmlns:r="http://schemas.openxmlformats.org/officeDocument/2006/relationships" xmlns:p="http://schemas.openxmlformats.org/presentationml/2006/main">
+  <p:cSld>
+    <p:spTree>
+      <p:nvGrpSpPr>
+        <p:cNvPr id="1" name=""/>
+        <p:cNvGrpSpPr/>
+        <p:nvPr/>
+      </p:nvGrpSpPr>
+      <p:grpSpPr>
+        <a:xfrm>
+          <a:off x="0" y="0"/>
+          <a:ext cx="0" cy="0"/>
+          <a:chOff x="0" y="0"/>
+          <a:chExt cx="0" cy="0"/>
+        </a:xfrm>
+      </p:grpSpPr>
+      <p:sp>
+        <p:nvSpPr>
           <p:cNvPr id="2" name="標題 1"/>
           <p:cNvSpPr>
             <a:spLocks noGrp="1"/>
@@ -7645,7 +7789,7 @@
           <a:p>
             <a:fld id="{458270D0-B830-4E87-A9C7-B662AFD560B4}" type="slidenum">
               <a:rPr lang="zh-TW" altLang="en-US" smtClean="0"/>
-              <a:t>14</a:t>
+              <a:t>15</a:t>
             </a:fld>
             <a:endParaRPr lang="zh-TW" altLang="en-US"/>
           </a:p>
@@ -7735,7 +7879,7 @@
 </p:sld>
 </file>
 
-<file path=ppt/slides/slide15.xml><?xml version="1.0" encoding="utf-8"?>
+<file path=ppt/slides/slide16.xml><?xml version="1.0" encoding="utf-8"?>
 <p:sld xmlns:a="http://schemas.openxmlformats.org/drawingml/2006/main" xmlns:r="http://schemas.openxmlformats.org/officeDocument/2006/relationships" xmlns:p="http://schemas.openxmlformats.org/presentationml/2006/main">
   <p:cSld>
     <p:spTree>
@@ -8131,14 +8275,7 @@
                 <a:latin typeface="微軟正黑體" pitchFamily="34" charset="-120"/>
                 <a:ea typeface="微軟正黑體" pitchFamily="34" charset="-120"/>
               </a:rPr>
-              <a:t>新竹市醫療機構牙醫診所</a:t>
-            </a:r>
-            <a:r>
-              <a:rPr lang="zh-TW" altLang="en-US" sz="2000" dirty="0" smtClean="0">
-                <a:latin typeface="微軟正黑體" pitchFamily="34" charset="-120"/>
-                <a:ea typeface="微軟正黑體" pitchFamily="34" charset="-120"/>
-              </a:rPr>
-              <a:t>名冊</a:t>
+              <a:t>新竹市醫療機構牙醫診所名冊</a:t>
             </a:r>
             <a:endParaRPr lang="en-US" altLang="zh-TW" sz="2000" dirty="0" smtClean="0">
               <a:latin typeface="微軟正黑體" pitchFamily="34" charset="-120"/>

</xml_diff>